<commit_message>
Calculo Diferencial e Integral -> Limites
</commit_message>
<xml_diff>
--- a/MatematicaPython.pptx
+++ b/MatematicaPython.pptx
@@ -10546,8 +10546,8 @@
         </p:nvSpPr>
         <p:spPr>
           <a:xfrm>
-            <a:off x="793525" y="2727119"/>
-            <a:ext cx="7915628" cy="738664"/>
+            <a:off x="3591636" y="2587904"/>
+            <a:ext cx="1959832" cy="738664"/>
           </a:xfrm>
           <a:prstGeom prst="rect">
             <a:avLst/>
@@ -10572,37 +10572,7 @@
                 <a:latin typeface="Arial" panose="020B0604020202020204"/>
                 <a:cs typeface="Arial" panose="020B0604020202020204"/>
               </a:rPr>
-              <a:t>Cálculo</a:t>
-            </a:r>
-            <a:r>
-              <a:rPr lang="en-US" sz="4800" spc="10" dirty="0">
-                <a:solidFill>
-                  <a:srgbClr val="FFFFFF"/>
-                </a:solidFill>
-                <a:latin typeface="Arial" panose="020B0604020202020204"/>
-                <a:cs typeface="Arial" panose="020B0604020202020204"/>
-              </a:rPr>
-              <a:t> </a:t>
-            </a:r>
-            <a:r>
-              <a:rPr lang="en-US" sz="4800" spc="10" dirty="0" err="1">
-                <a:solidFill>
-                  <a:srgbClr val="FFFFFF"/>
-                </a:solidFill>
-                <a:latin typeface="Arial" panose="020B0604020202020204"/>
-                <a:cs typeface="Arial" panose="020B0604020202020204"/>
-              </a:rPr>
-              <a:t>Diferencial</a:t>
-            </a:r>
-            <a:r>
-              <a:rPr lang="en-US" sz="4800" spc="10" dirty="0">
-                <a:solidFill>
-                  <a:srgbClr val="FFFFFF"/>
-                </a:solidFill>
-                <a:latin typeface="Arial" panose="020B0604020202020204"/>
-                <a:cs typeface="Arial" panose="020B0604020202020204"/>
-              </a:rPr>
-              <a:t> e Integral</a:t>
+              <a:t>Limites</a:t>
             </a:r>
             <a:endParaRPr sz="4800" dirty="0">
               <a:latin typeface="Arial" panose="020B0604020202020204"/>
@@ -11571,22 +11541,12 @@
                 <a:latin typeface="Times New Roman" panose="02020603050405020304" pitchFamily="18" charset="0"/>
                 <a:cs typeface="Times New Roman" panose="02020603050405020304" pitchFamily="18" charset="0"/>
               </a:rPr>
-              <a:t>Sobre</a:t>
-            </a:r>
-            <a:r>
-              <a:rPr lang="en-US" sz="4000" dirty="0">
-                <a:latin typeface="Times New Roman" panose="02020603050405020304" pitchFamily="18" charset="0"/>
-                <a:cs typeface="Times New Roman" panose="02020603050405020304" pitchFamily="18" charset="0"/>
-              </a:rPr>
-              <a:t> </a:t>
-            </a:r>
-            <a:r>
-              <a:rPr lang="pt-BR" altLang="en-US" sz="4000" dirty="0">
-                <a:latin typeface="Times New Roman" panose="02020603050405020304" pitchFamily="18" charset="0"/>
-                <a:cs typeface="Times New Roman" panose="02020603050405020304" pitchFamily="18" charset="0"/>
-              </a:rPr>
-              <a:t>Cálculo Diferencial e Integral</a:t>
-            </a:r>
+              <a:t>Limites</a:t>
+            </a:r>
+            <a:endParaRPr lang="pt-BR" altLang="en-US" sz="4000" dirty="0">
+              <a:latin typeface="Times New Roman" panose="02020603050405020304" pitchFamily="18" charset="0"/>
+              <a:cs typeface="Times New Roman" panose="02020603050405020304" pitchFamily="18" charset="0"/>
+            </a:endParaRPr>
           </a:p>
         </p:txBody>
       </p:sp>
@@ -11987,22 +11947,12 @@
                 <a:latin typeface="Times New Roman" panose="02020603050405020304" pitchFamily="18" charset="0"/>
                 <a:cs typeface="Times New Roman" panose="02020603050405020304" pitchFamily="18" charset="0"/>
               </a:rPr>
-              <a:t>Sobre</a:t>
-            </a:r>
-            <a:r>
-              <a:rPr lang="en-US" sz="4000" dirty="0">
-                <a:latin typeface="Times New Roman" panose="02020603050405020304" pitchFamily="18" charset="0"/>
-                <a:cs typeface="Times New Roman" panose="02020603050405020304" pitchFamily="18" charset="0"/>
-              </a:rPr>
-              <a:t> </a:t>
-            </a:r>
-            <a:r>
-              <a:rPr lang="pt-BR" altLang="en-US" sz="4000" dirty="0">
-                <a:latin typeface="Times New Roman" panose="02020603050405020304" pitchFamily="18" charset="0"/>
-                <a:cs typeface="Times New Roman" panose="02020603050405020304" pitchFamily="18" charset="0"/>
-              </a:rPr>
-              <a:t>Cálculo Diferencial e Integral</a:t>
-            </a:r>
+              <a:t>Limites</a:t>
+            </a:r>
+            <a:endParaRPr lang="pt-BR" altLang="en-US" sz="4000" dirty="0">
+              <a:latin typeface="Times New Roman" panose="02020603050405020304" pitchFamily="18" charset="0"/>
+              <a:cs typeface="Times New Roman" panose="02020603050405020304" pitchFamily="18" charset="0"/>
+            </a:endParaRPr>
           </a:p>
         </p:txBody>
       </p:sp>
@@ -12550,22 +12500,12 @@
                 <a:latin typeface="Times New Roman" panose="02020603050405020304" pitchFamily="18" charset="0"/>
                 <a:cs typeface="Times New Roman" panose="02020603050405020304" pitchFamily="18" charset="0"/>
               </a:rPr>
-              <a:t>Sobre</a:t>
-            </a:r>
-            <a:r>
-              <a:rPr lang="en-US" sz="4000" dirty="0">
-                <a:latin typeface="Times New Roman" panose="02020603050405020304" pitchFamily="18" charset="0"/>
-                <a:cs typeface="Times New Roman" panose="02020603050405020304" pitchFamily="18" charset="0"/>
-              </a:rPr>
-              <a:t> </a:t>
-            </a:r>
-            <a:r>
-              <a:rPr lang="pt-BR" altLang="en-US" sz="4000" dirty="0">
-                <a:latin typeface="Times New Roman" panose="02020603050405020304" pitchFamily="18" charset="0"/>
-                <a:cs typeface="Times New Roman" panose="02020603050405020304" pitchFamily="18" charset="0"/>
-              </a:rPr>
-              <a:t>Cálculo Diferencial e Integral</a:t>
-            </a:r>
+              <a:t>Limites</a:t>
+            </a:r>
+            <a:endParaRPr lang="pt-BR" altLang="en-US" sz="4000" dirty="0">
+              <a:latin typeface="Times New Roman" panose="02020603050405020304" pitchFamily="18" charset="0"/>
+              <a:cs typeface="Times New Roman" panose="02020603050405020304" pitchFamily="18" charset="0"/>
+            </a:endParaRPr>
           </a:p>
         </p:txBody>
       </p:sp>
@@ -12723,26 +12663,16 @@
           <a:p>
             <a:pPr algn="ctr"/>
             <a:r>
-              <a:rPr lang="en-US" sz="4000" dirty="0" err="1">
-                <a:latin typeface="Times New Roman" panose="02020603050405020304" pitchFamily="18" charset="0"/>
-                <a:cs typeface="Times New Roman" panose="02020603050405020304" pitchFamily="18" charset="0"/>
-              </a:rPr>
-              <a:t>Sobre</a:t>
-            </a:r>
-            <a:r>
-              <a:rPr lang="en-US" sz="4000" dirty="0">
-                <a:latin typeface="Times New Roman" panose="02020603050405020304" pitchFamily="18" charset="0"/>
-                <a:cs typeface="Times New Roman" panose="02020603050405020304" pitchFamily="18" charset="0"/>
-              </a:rPr>
-              <a:t> </a:t>
-            </a:r>
-            <a:r>
-              <a:rPr lang="pt-BR" altLang="en-US" sz="4000" dirty="0">
-                <a:latin typeface="Times New Roman" panose="02020603050405020304" pitchFamily="18" charset="0"/>
-                <a:cs typeface="Times New Roman" panose="02020603050405020304" pitchFamily="18" charset="0"/>
-              </a:rPr>
-              <a:t>Cálculo Diferencial e Integral</a:t>
-            </a:r>
+              <a:rPr lang="en-US" altLang="en-US" sz="4000" dirty="0" err="1">
+                <a:latin typeface="Times New Roman" panose="02020603050405020304" pitchFamily="18" charset="0"/>
+                <a:cs typeface="Times New Roman" panose="02020603050405020304" pitchFamily="18" charset="0"/>
+              </a:rPr>
+              <a:t>Limites</a:t>
+            </a:r>
+            <a:endParaRPr lang="pt-BR" altLang="en-US" sz="4000" dirty="0">
+              <a:latin typeface="Times New Roman" panose="02020603050405020304" pitchFamily="18" charset="0"/>
+              <a:cs typeface="Times New Roman" panose="02020603050405020304" pitchFamily="18" charset="0"/>
+            </a:endParaRPr>
           </a:p>
         </p:txBody>
       </p:sp>

</xml_diff>